<commit_message>
Comentarios en archivo BlackBerry, SMS y 3G
</commit_message>
<xml_diff>
--- a/BlackBerry, SMS y 3G.pptx
+++ b/BlackBerry, SMS y 3G.pptx
@@ -123,6 +123,22 @@
       </a:defRPr>
     </a:lvl9pPr>
   </p:defaultTextStyle>
+  <p:extLst>
+    <p:ext uri="{EFAFB233-063F-42B5-8137-9DF3F51BA10A}">
+      <p15:sldGuideLst xmlns:p15="http://schemas.microsoft.com/office/powerpoint/2012/main">
+        <p15:guide id="1" orient="horz" pos="2160">
+          <p15:clr>
+            <a:srgbClr val="A4A3A4"/>
+          </p15:clr>
+        </p15:guide>
+        <p15:guide id="2" pos="2880">
+          <p15:clr>
+            <a:srgbClr val="A4A3A4"/>
+          </p15:clr>
+        </p15:guide>
+      </p15:sldGuideLst>
+    </p:ext>
+  </p:extLst>
 </p:presentation>
 </file>
 
@@ -4565,12 +4581,38 @@
               <a:t>; </a:t>
             </a:r>
             <a:r>
-              <a:rPr lang="es-MX" sz="2800"/>
-              <a:t>w</a:t>
+              <a:rPr lang="es-MX" sz="2800" dirty="0" err="1" smtClean="0"/>
+              <a:t>wow</a:t>
+            </a:r>
+            <a:r>
+              <a:rPr lang="es-MX" sz="2800" dirty="0" smtClean="0"/>
+              <a:t/>
+            </a:r>
+            <a:br>
+              <a:rPr lang="es-MX" sz="2800" dirty="0" smtClean="0"/>
+            </a:br>
+            <a:r>
+              <a:rPr lang="es-MX" sz="2800" dirty="0"/>
+              <a:t/>
+            </a:r>
+            <a:br>
+              <a:rPr lang="es-MX" sz="2800" dirty="0"/>
+            </a:br>
+            <a:r>
+              <a:rPr lang="es-MX" sz="2800" smtClean="0">
+                <a:solidFill>
+                  <a:srgbClr val="FF0000"/>
+                </a:solidFill>
+              </a:rPr>
+              <a:t>Javier Lizárraga:</a:t>
             </a:r>
             <a:r>
               <a:rPr lang="es-MX" sz="2800" smtClean="0"/>
-              <a:t>ow</a:t>
+              <a:t> </a:t>
+            </a:r>
+            <a:r>
+              <a:rPr lang="es-MX" sz="2800" dirty="0" smtClean="0"/>
+              <a:t>Interesante.</a:t>
             </a:r>
             <a:r>
               <a:rPr lang="es-MX" sz="2800" dirty="0"/>
@@ -4593,6 +4635,13 @@
   <p:clrMapOvr>
     <a:masterClrMapping/>
   </p:clrMapOvr>
+  <p:timing>
+    <p:tnLst>
+      <p:par>
+        <p:cTn id="1" dur="indefinite" restart="never" nodeType="tmRoot"/>
+      </p:par>
+    </p:tnLst>
+  </p:timing>
 </p:sld>
 </file>
 

</xml_diff>